<commit_message>
macro feature full numbers to custom props workaround, presentation ready
</commit_message>
<xml_diff>
--- a/doc/HDCLOUD_CADCloud_Project_Leszek_Dubicki_Project_Presentation.pptx
+++ b/doc/HDCLOUD_CADCloud_Project_Leszek_Dubicki_Project_Presentation.pptx
@@ -186,7 +186,7 @@
     </p:spTree>
     <p:extLst>
       <p:ext uri="{BB962C8B-B14F-4D97-AF65-F5344CB8AC3E}">
-        <p14:creationId xmlns:p14="http://schemas.microsoft.com/office/powerpoint/2010/main" xmlns="" val="4044636885"/>
+        <p14:creationId xmlns="" xmlns:p14="http://schemas.microsoft.com/office/powerpoint/2010/main" val="4044636885"/>
       </p:ext>
     </p:extLst>
   </p:cSld>
@@ -921,7 +921,7 @@
             <a:fld id="{F8CFA630-13BB-46C4-BD44-B2C5F9B66074}" type="datetimeFigureOut">
               <a:rPr lang="en-US" smtClean="0"/>
               <a:pPr/>
-              <a:t>12/13/2015</a:t>
+              <a:t>12/14/2015</a:t>
             </a:fld>
             <a:endParaRPr lang="en-US" dirty="0">
               <a:solidFill>
@@ -1128,7 +1128,7 @@
             <a:fld id="{F8CFA630-13BB-46C4-BD44-B2C5F9B66074}" type="datetimeFigureOut">
               <a:rPr lang="en-US" smtClean="0"/>
               <a:pPr/>
-              <a:t>12/13/2015</a:t>
+              <a:t>12/14/2015</a:t>
             </a:fld>
             <a:endParaRPr lang="en-US"/>
           </a:p>
@@ -1316,7 +1316,7 @@
             <a:fld id="{F8CFA630-13BB-46C4-BD44-B2C5F9B66074}" type="datetimeFigureOut">
               <a:rPr lang="en-US" smtClean="0"/>
               <a:pPr/>
-              <a:t>12/13/2015</a:t>
+              <a:t>12/14/2015</a:t>
             </a:fld>
             <a:endParaRPr lang="en-US" dirty="0"/>
           </a:p>
@@ -1583,7 +1583,7 @@
             <a:fld id="{F8CFA630-13BB-46C4-BD44-B2C5F9B66074}" type="datetimeFigureOut">
               <a:rPr lang="en-US" smtClean="0"/>
               <a:pPr/>
-              <a:t>12/13/2015</a:t>
+              <a:t>12/14/2015</a:t>
             </a:fld>
             <a:endParaRPr lang="en-US"/>
           </a:p>
@@ -1841,7 +1841,7 @@
             <a:fld id="{F8CFA630-13BB-46C4-BD44-B2C5F9B66074}" type="datetimeFigureOut">
               <a:rPr lang="en-US" smtClean="0"/>
               <a:pPr/>
-              <a:t>12/13/2015</a:t>
+              <a:t>12/14/2015</a:t>
             </a:fld>
             <a:endParaRPr lang="en-US">
               <a:solidFill>
@@ -2261,7 +2261,7 @@
             <a:fld id="{F8CFA630-13BB-46C4-BD44-B2C5F9B66074}" type="datetimeFigureOut">
               <a:rPr lang="en-US" smtClean="0"/>
               <a:pPr/>
-              <a:t>12/13/2015</a:t>
+              <a:t>12/14/2015</a:t>
             </a:fld>
             <a:endParaRPr lang="en-US"/>
           </a:p>
@@ -2710,7 +2710,7 @@
             <a:fld id="{F8CFA630-13BB-46C4-BD44-B2C5F9B66074}" type="datetimeFigureOut">
               <a:rPr lang="en-US" smtClean="0"/>
               <a:pPr/>
-              <a:t>12/13/2015</a:t>
+              <a:t>12/14/2015</a:t>
             </a:fld>
             <a:endParaRPr lang="en-US"/>
           </a:p>
@@ -2814,7 +2814,7 @@
             <a:fld id="{F8CFA630-13BB-46C4-BD44-B2C5F9B66074}" type="datetimeFigureOut">
               <a:rPr lang="en-US" smtClean="0"/>
               <a:pPr/>
-              <a:t>12/13/2015</a:t>
+              <a:t>12/14/2015</a:t>
             </a:fld>
             <a:endParaRPr lang="en-US"/>
           </a:p>
@@ -2938,7 +2938,7 @@
             <a:fld id="{F8CFA630-13BB-46C4-BD44-B2C5F9B66074}" type="datetimeFigureOut">
               <a:rPr lang="en-US" smtClean="0"/>
               <a:pPr/>
-              <a:t>12/13/2015</a:t>
+              <a:t>12/14/2015</a:t>
             </a:fld>
             <a:endParaRPr lang="en-US" dirty="0">
               <a:solidFill>
@@ -3223,7 +3223,7 @@
             <a:fld id="{F8CFA630-13BB-46C4-BD44-B2C5F9B66074}" type="datetimeFigureOut">
               <a:rPr lang="en-US" smtClean="0"/>
               <a:pPr/>
-              <a:t>12/13/2015</a:t>
+              <a:t>12/14/2015</a:t>
             </a:fld>
             <a:endParaRPr lang="en-US"/>
           </a:p>
@@ -3431,7 +3431,7 @@
             <a:fld id="{F8CFA630-13BB-46C4-BD44-B2C5F9B66074}" type="datetimeFigureOut">
               <a:rPr lang="en-US" smtClean="0"/>
               <a:pPr/>
-              <a:t>12/13/2015</a:t>
+              <a:t>12/14/2015</a:t>
             </a:fld>
             <a:endParaRPr lang="en-US"/>
           </a:p>
@@ -4543,7 +4543,7 @@
             <a:fld id="{F8CFA630-13BB-46C4-BD44-B2C5F9B66074}" type="datetimeFigureOut">
               <a:rPr lang="en-US" smtClean="0"/>
               <a:pPr/>
-              <a:t>12/13/2015</a:t>
+              <a:t>12/14/2015</a:t>
             </a:fld>
             <a:endParaRPr lang="en-US" sz="1000" dirty="0">
               <a:solidFill>
@@ -4982,7 +4982,7 @@
           </a:prstGeom>
           <a:extLst>
             <a:ext uri="{C572A759-6A51-4108-AA02-DFA0A04FC94B}">
-              <ma14:wrappingTextBoxFlag xmlns="" xmlns:ma14="http://schemas.microsoft.com/office/mac/drawingml/2011/main" val="1"/>
+              <ma14:wrappingTextBoxFlag xmlns:ma14="http://schemas.microsoft.com/office/mac/drawingml/2011/main" xmlns="" val="1"/>
             </a:ext>
           </a:extLst>
         </p:spPr>
@@ -5023,7 +5023,7 @@
           </a:prstGeom>
           <a:extLst>
             <a:ext uri="{C572A759-6A51-4108-AA02-DFA0A04FC94B}">
-              <ma14:wrappingTextBoxFlag xmlns="" xmlns:ma14="http://schemas.microsoft.com/office/mac/drawingml/2011/main" val="1"/>
+              <ma14:wrappingTextBoxFlag xmlns:ma14="http://schemas.microsoft.com/office/mac/drawingml/2011/main" xmlns="" val="1"/>
             </a:ext>
           </a:extLst>
         </p:spPr>
@@ -5144,7 +5144,7 @@
           </a:prstGeom>
           <a:extLst>
             <a:ext uri="{C572A759-6A51-4108-AA02-DFA0A04FC94B}">
-              <ma14:wrappingTextBoxFlag xmlns="" xmlns:ma14="http://schemas.microsoft.com/office/mac/drawingml/2011/main" val="1"/>
+              <ma14:wrappingTextBoxFlag xmlns:ma14="http://schemas.microsoft.com/office/mac/drawingml/2011/main" xmlns="" val="1"/>
             </a:ext>
           </a:extLst>
         </p:spPr>
@@ -5185,7 +5185,7 @@
           </a:prstGeom>
           <a:extLst>
             <a:ext uri="{C572A759-6A51-4108-AA02-DFA0A04FC94B}">
-              <ma14:wrappingTextBoxFlag xmlns="" xmlns:ma14="http://schemas.microsoft.com/office/mac/drawingml/2011/main" val="1"/>
+              <ma14:wrappingTextBoxFlag xmlns:ma14="http://schemas.microsoft.com/office/mac/drawingml/2011/main" xmlns="" val="1"/>
             </a:ext>
           </a:extLst>
         </p:spPr>
@@ -5315,7 +5315,7 @@
           </a:prstGeom>
           <a:extLst>
             <a:ext uri="{C572A759-6A51-4108-AA02-DFA0A04FC94B}">
-              <ma14:wrappingTextBoxFlag xmlns="" xmlns:ma14="http://schemas.microsoft.com/office/mac/drawingml/2011/main" val="1"/>
+              <ma14:wrappingTextBoxFlag xmlns:ma14="http://schemas.microsoft.com/office/mac/drawingml/2011/main" xmlns="" val="1"/>
             </a:ext>
           </a:extLst>
         </p:spPr>
@@ -5356,7 +5356,7 @@
           </a:prstGeom>
           <a:extLst>
             <a:ext uri="{C572A759-6A51-4108-AA02-DFA0A04FC94B}">
-              <ma14:wrappingTextBoxFlag xmlns="" xmlns:ma14="http://schemas.microsoft.com/office/mac/drawingml/2011/main" val="1"/>
+              <ma14:wrappingTextBoxFlag xmlns:ma14="http://schemas.microsoft.com/office/mac/drawingml/2011/main" xmlns="" val="1"/>
             </a:ext>
           </a:extLst>
         </p:spPr>
@@ -5611,7 +5611,7 @@
           </a:prstGeom>
           <a:extLst>
             <a:ext uri="{C572A759-6A51-4108-AA02-DFA0A04FC94B}">
-              <ma14:wrappingTextBoxFlag xmlns="" xmlns:ma14="http://schemas.microsoft.com/office/mac/drawingml/2011/main" val="1"/>
+              <ma14:wrappingTextBoxFlag xmlns:ma14="http://schemas.microsoft.com/office/mac/drawingml/2011/main" xmlns="" val="1"/>
             </a:ext>
           </a:extLst>
         </p:spPr>
@@ -5660,7 +5660,7 @@
           </a:prstGeom>
           <a:extLst>
             <a:ext uri="{C572A759-6A51-4108-AA02-DFA0A04FC94B}">
-              <ma14:wrappingTextBoxFlag xmlns="" xmlns:ma14="http://schemas.microsoft.com/office/mac/drawingml/2011/main" val="1"/>
+              <ma14:wrappingTextBoxFlag xmlns:ma14="http://schemas.microsoft.com/office/mac/drawingml/2011/main" xmlns="" val="1"/>
             </a:ext>
           </a:extLst>
         </p:spPr>
@@ -5854,6 +5854,38 @@
           <a:chExt cx="0" cy="0"/>
         </a:xfrm>
       </p:grpSpPr>
+      <p:pic>
+        <p:nvPicPr>
+          <p:cNvPr id="1026" name="Picture 2"/>
+          <p:cNvPicPr>
+            <a:picLocks noChangeAspect="1" noChangeArrowheads="1"/>
+          </p:cNvPicPr>
+          <p:nvPr/>
+        </p:nvPicPr>
+        <p:blipFill>
+          <a:blip r:embed="rId2" cstate="print"/>
+          <a:srcRect/>
+          <a:stretch>
+            <a:fillRect/>
+          </a:stretch>
+        </p:blipFill>
+        <p:spPr bwMode="auto">
+          <a:xfrm>
+            <a:off x="4057071" y="1688051"/>
+            <a:ext cx="4644458" cy="4276651"/>
+          </a:xfrm>
+          <a:prstGeom prst="rect">
+            <a:avLst/>
+          </a:prstGeom>
+          <a:noFill/>
+          <a:ln w="9525">
+            <a:noFill/>
+            <a:miter lim="800000"/>
+            <a:headEnd/>
+            <a:tailEnd/>
+          </a:ln>
+        </p:spPr>
+      </p:pic>
       <p:sp>
         <p:nvSpPr>
           <p:cNvPr id="40" name="Shape 40"/>
@@ -5874,7 +5906,7 @@
           </a:prstGeom>
           <a:extLst>
             <a:ext uri="{C572A759-6A51-4108-AA02-DFA0A04FC94B}">
-              <ma14:wrappingTextBoxFlag xmlns="" xmlns:ma14="http://schemas.microsoft.com/office/mac/drawingml/2011/main" val="1"/>
+              <ma14:wrappingTextBoxFlag xmlns:ma14="http://schemas.microsoft.com/office/mac/drawingml/2011/main" xmlns="" val="1"/>
             </a:ext>
           </a:extLst>
         </p:spPr>
@@ -5923,7 +5955,7 @@
           </a:prstGeom>
           <a:extLst>
             <a:ext uri="{C572A759-6A51-4108-AA02-DFA0A04FC94B}">
-              <ma14:wrappingTextBoxFlag xmlns="" xmlns:ma14="http://schemas.microsoft.com/office/mac/drawingml/2011/main" val="1"/>
+              <ma14:wrappingTextBoxFlag xmlns:ma14="http://schemas.microsoft.com/office/mac/drawingml/2011/main" xmlns="" val="1"/>
             </a:ext>
           </a:extLst>
         </p:spPr>
@@ -6030,7 +6062,7 @@
         </p:nvSpPr>
         <p:spPr>
           <a:xfrm>
-            <a:off x="629529" y="412651"/>
+            <a:off x="629529" y="314177"/>
             <a:ext cx="7772400" cy="1143002"/>
           </a:xfrm>
           <a:prstGeom prst="rect">
@@ -6038,7 +6070,7 @@
           </a:prstGeom>
           <a:extLst>
             <a:ext uri="{C572A759-6A51-4108-AA02-DFA0A04FC94B}">
-              <ma14:wrappingTextBoxFlag xmlns="" xmlns:ma14="http://schemas.microsoft.com/office/mac/drawingml/2011/main" val="1"/>
+              <ma14:wrappingTextBoxFlag xmlns:ma14="http://schemas.microsoft.com/office/mac/drawingml/2011/main" xmlns="" val="1"/>
             </a:ext>
           </a:extLst>
         </p:spPr>
@@ -6070,7 +6102,7 @@
         </p:nvSpPr>
         <p:spPr>
           <a:xfrm>
-            <a:off x="601394" y="1488830"/>
+            <a:off x="573258" y="1221544"/>
             <a:ext cx="7772400" cy="5165188"/>
           </a:xfrm>
           <a:prstGeom prst="rect">
@@ -6078,7 +6110,7 @@
           </a:prstGeom>
           <a:extLst>
             <a:ext uri="{C572A759-6A51-4108-AA02-DFA0A04FC94B}">
-              <ma14:wrappingTextBoxFlag xmlns="" xmlns:ma14="http://schemas.microsoft.com/office/mac/drawingml/2011/main" val="1"/>
+              <ma14:wrappingTextBoxFlag xmlns:ma14="http://schemas.microsoft.com/office/mac/drawingml/2011/main" xmlns="" val="1"/>
             </a:ext>
           </a:extLst>
         </p:spPr>
@@ -6167,9 +6199,18 @@
               <a:defRPr sz="1800"/>
             </a:pPr>
             <a:r>
+              <a:rPr lang="pl-PL" sz="2800" dirty="0" err="1" smtClean="0"/>
+              <a:t>Lists</a:t>
+            </a:r>
+            <a:r>
+              <a:rPr lang="pl-PL" sz="2800" dirty="0" smtClean="0"/>
+              <a:t>/</a:t>
+            </a:r>
+            <a:r>
               <a:rPr lang="en-US" sz="2800" dirty="0" smtClean="0"/>
               <a:t>Arrays</a:t>
             </a:r>
+            <a:endParaRPr lang="en-US" sz="2800" dirty="0" smtClean="0"/>
           </a:p>
           <a:p>
             <a:pPr lvl="1">
@@ -6368,7 +6409,7 @@
           </a:prstGeom>
           <a:extLst>
             <a:ext uri="{C572A759-6A51-4108-AA02-DFA0A04FC94B}">
-              <ma14:wrappingTextBoxFlag xmlns="" xmlns:ma14="http://schemas.microsoft.com/office/mac/drawingml/2011/main" val="1"/>
+              <ma14:wrappingTextBoxFlag xmlns:ma14="http://schemas.microsoft.com/office/mac/drawingml/2011/main" xmlns="" val="1"/>
             </a:ext>
           </a:extLst>
         </p:spPr>
@@ -6408,13 +6449,13 @@
           </a:prstGeom>
           <a:extLst>
             <a:ext uri="{C572A759-6A51-4108-AA02-DFA0A04FC94B}">
-              <ma14:wrappingTextBoxFlag xmlns="" xmlns:ma14="http://schemas.microsoft.com/office/mac/drawingml/2011/main" val="1"/>
+              <ma14:wrappingTextBoxFlag xmlns:ma14="http://schemas.microsoft.com/office/mac/drawingml/2011/main" xmlns="" val="1"/>
             </a:ext>
           </a:extLst>
         </p:spPr>
         <p:txBody>
           <a:bodyPr lIns="0" tIns="0" rIns="0" bIns="0">
-            <a:normAutofit/>
+            <a:normAutofit fontScale="85000" lnSpcReduction="20000"/>
           </a:bodyPr>
           <a:lstStyle/>
           <a:p>
@@ -6423,14 +6464,39 @@
               <a:defRPr sz="1800"/>
             </a:pPr>
             <a:r>
-              <a:rPr sz="3200" dirty="0"/>
-              <a:t>How did you evaluate the system</a:t>
-            </a:r>
-            <a:r>
-              <a:rPr sz="3200" dirty="0" smtClean="0"/>
-              <a:t>?</a:t>
-            </a:r>
-            <a:endParaRPr lang="en-US" sz="3200" dirty="0" smtClean="0"/>
+              <a:rPr lang="pl-PL" sz="3200" dirty="0" err="1" smtClean="0"/>
+              <a:t>Deployed</a:t>
+            </a:r>
+            <a:r>
+              <a:rPr lang="pl-PL" sz="3200" dirty="0" smtClean="0"/>
+              <a:t> to </a:t>
+            </a:r>
+            <a:r>
+              <a:rPr lang="pl-PL" sz="3200" dirty="0" err="1" smtClean="0"/>
+              <a:t>pythonanywhare.com</a:t>
+            </a:r>
+            <a:endParaRPr lang="pl-PL" sz="3200" dirty="0" smtClean="0"/>
+          </a:p>
+          <a:p>
+            <a:pPr lvl="0">
+              <a:buNone/>
+              <a:defRPr sz="1800"/>
+            </a:pPr>
+            <a:r>
+              <a:rPr lang="pl-PL" sz="2400" dirty="0" smtClean="0"/>
+              <a:t>	</a:t>
+            </a:r>
+            <a:r>
+              <a:rPr lang="pl-PL" sz="2400" dirty="0" smtClean="0"/>
+              <a:t>	</a:t>
+            </a:r>
+            <a:r>
+              <a:rPr lang="pl-PL" sz="2400" dirty="0" smtClean="0">
+                <a:hlinkClick r:id="rId2"/>
+              </a:rPr>
+              <a:t>http://leszekdubicki.pythonanywhere.com/</a:t>
+            </a:r>
+            <a:endParaRPr lang="en-US" sz="2400" dirty="0" smtClean="0"/>
           </a:p>
           <a:p>
             <a:pPr lvl="0">
@@ -6440,14 +6506,116 @@
             <a:endParaRPr lang="en-US" dirty="0"/>
           </a:p>
           <a:p>
+            <a:pPr>
+              <a:buFont typeface="Wingdings 3"/>
+              <a:buChar char="•"/>
+              <a:defRPr sz="1800"/>
+            </a:pPr>
+            <a:endParaRPr lang="pl-PL" sz="3200" dirty="0" smtClean="0"/>
+          </a:p>
+          <a:p>
+            <a:pPr>
+              <a:buFont typeface="Wingdings 3"/>
+              <a:buChar char="•"/>
+              <a:defRPr sz="1800"/>
+            </a:pPr>
+            <a:r>
+              <a:rPr lang="en-US" sz="3200" dirty="0" smtClean="0"/>
+              <a:t>Example </a:t>
+            </a:r>
+            <a:r>
+              <a:rPr lang="en-US" sz="3200" dirty="0" smtClean="0"/>
+              <a:t>CAD projects using the CC server features were made?</a:t>
+            </a:r>
+          </a:p>
+          <a:p>
             <a:pPr lvl="0">
               <a:buChar char="•"/>
               <a:defRPr sz="1800"/>
             </a:pPr>
+            <a:endParaRPr lang="pl-PL" sz="3200" dirty="0" smtClean="0"/>
+          </a:p>
+          <a:p>
+            <a:pPr lvl="0">
+              <a:buChar char="•"/>
+              <a:defRPr sz="1800"/>
+            </a:pPr>
+            <a:endParaRPr lang="pl-PL" sz="3200" dirty="0" smtClean="0"/>
+          </a:p>
+          <a:p>
+            <a:pPr lvl="0">
+              <a:buChar char="•"/>
+              <a:defRPr sz="1800"/>
+            </a:pPr>
             <a:r>
               <a:rPr lang="en-US" sz="3200" dirty="0" smtClean="0"/>
-              <a:t>Testing procedure</a:t>
-            </a:r>
+              <a:t>Testing </a:t>
+            </a:r>
+            <a:r>
+              <a:rPr lang="pl-PL" sz="3200" dirty="0" smtClean="0"/>
+              <a:t>scripts </a:t>
+            </a:r>
+            <a:r>
+              <a:rPr lang="pl-PL" sz="3200" dirty="0" err="1" smtClean="0"/>
+              <a:t>sending</a:t>
+            </a:r>
+            <a:r>
+              <a:rPr lang="pl-PL" sz="3200" dirty="0" smtClean="0"/>
+              <a:t> random data to </a:t>
+            </a:r>
+            <a:r>
+              <a:rPr lang="pl-PL" sz="3200" dirty="0" err="1" smtClean="0"/>
+              <a:t>the</a:t>
+            </a:r>
+            <a:r>
+              <a:rPr lang="pl-PL" sz="3200" dirty="0" smtClean="0"/>
+              <a:t> </a:t>
+            </a:r>
+            <a:r>
+              <a:rPr lang="pl-PL" sz="3200" dirty="0" err="1" smtClean="0"/>
+              <a:t>server</a:t>
+            </a:r>
+            <a:r>
+              <a:rPr lang="pl-PL" sz="3200" dirty="0" smtClean="0"/>
+              <a:t> and </a:t>
+            </a:r>
+            <a:r>
+              <a:rPr lang="pl-PL" sz="3200" dirty="0" err="1" smtClean="0"/>
+              <a:t>retrieving</a:t>
+            </a:r>
+            <a:r>
+              <a:rPr lang="pl-PL" sz="3200" dirty="0" smtClean="0"/>
+              <a:t> data </a:t>
+            </a:r>
+            <a:r>
+              <a:rPr lang="pl-PL" sz="3200" dirty="0" err="1" smtClean="0"/>
+              <a:t>from</a:t>
+            </a:r>
+            <a:r>
+              <a:rPr lang="pl-PL" sz="3200" dirty="0" smtClean="0"/>
+              <a:t> </a:t>
+            </a:r>
+            <a:r>
+              <a:rPr lang="pl-PL" sz="3200" dirty="0" err="1" smtClean="0"/>
+              <a:t>the</a:t>
+            </a:r>
+            <a:r>
+              <a:rPr lang="pl-PL" sz="3200" dirty="0" smtClean="0"/>
+              <a:t> </a:t>
+            </a:r>
+            <a:r>
+              <a:rPr lang="pl-PL" sz="3200" dirty="0" err="1" smtClean="0"/>
+              <a:t>server</a:t>
+            </a:r>
+            <a:r>
+              <a:rPr lang="pl-PL" sz="3200" dirty="0" smtClean="0"/>
+              <a:t> </a:t>
+            </a:r>
+            <a:r>
+              <a:rPr lang="pl-PL" sz="3200" dirty="0" err="1" smtClean="0"/>
+              <a:t>App</a:t>
+            </a:r>
+            <a:endParaRPr lang="en-US" sz="3200" dirty="0" smtClean="0"/>
           </a:p>
           <a:p>
             <a:pPr lvl="0">
@@ -6461,19 +6629,7 @@
               <a:buChar char="•"/>
               <a:defRPr sz="1800"/>
             </a:pPr>
-            <a:r>
-              <a:rPr sz="3200" dirty="0" smtClean="0"/>
-              <a:t>How did </a:t>
-            </a:r>
-            <a:r>
-              <a:rPr sz="3200" dirty="0"/>
-              <a:t>you evaluate the system from the user perspective</a:t>
-            </a:r>
-            <a:r>
-              <a:rPr sz="3200" dirty="0" smtClean="0"/>
-              <a:t>?</a:t>
-            </a:r>
-            <a:endParaRPr lang="en-US" sz="3200" dirty="0" smtClean="0"/>
+            <a:endParaRPr sz="3200" dirty="0"/>
           </a:p>
           <a:p>
             <a:pPr lvl="0">
@@ -6481,16 +6637,6 @@
               <a:defRPr sz="1800"/>
             </a:pPr>
             <a:endParaRPr sz="3200" dirty="0"/>
-          </a:p>
-          <a:p>
-            <a:pPr lvl="0">
-              <a:buChar char="•"/>
-              <a:defRPr sz="1800"/>
-            </a:pPr>
-            <a:r>
-              <a:rPr sz="3200" dirty="0"/>
-              <a:t>What are the results?</a:t>
-            </a:r>
           </a:p>
         </p:txBody>
       </p:sp>
@@ -6540,7 +6686,7 @@
           </a:prstGeom>
           <a:extLst>
             <a:ext uri="{C572A759-6A51-4108-AA02-DFA0A04FC94B}">
-              <ma14:wrappingTextBoxFlag xmlns="" xmlns:ma14="http://schemas.microsoft.com/office/mac/drawingml/2011/main" val="1"/>
+              <ma14:wrappingTextBoxFlag xmlns:ma14="http://schemas.microsoft.com/office/mac/drawingml/2011/main" xmlns="" val="1"/>
             </a:ext>
           </a:extLst>
         </p:spPr>
@@ -6581,7 +6727,7 @@
           </a:prstGeom>
           <a:extLst>
             <a:ext uri="{C572A759-6A51-4108-AA02-DFA0A04FC94B}">
-              <ma14:wrappingTextBoxFlag xmlns="" xmlns:ma14="http://schemas.microsoft.com/office/mac/drawingml/2011/main" val="1"/>
+              <ma14:wrappingTextBoxFlag xmlns:ma14="http://schemas.microsoft.com/office/mac/drawingml/2011/main" xmlns="" val="1"/>
             </a:ext>
           </a:extLst>
         </p:spPr>
@@ -6595,14 +6741,17 @@
               <a:buChar char="•"/>
               <a:defRPr sz="1800"/>
             </a:pPr>
-            <a:endParaRPr lang="en-US" sz="3200" dirty="0" smtClean="0"/>
+            <a:r>
+              <a:rPr lang="pl-PL" sz="3200" dirty="0" smtClean="0"/>
+              <a:t>Web Page</a:t>
+            </a:r>
           </a:p>
           <a:p>
             <a:pPr lvl="0">
               <a:buChar char="•"/>
               <a:defRPr sz="1800"/>
             </a:pPr>
-            <a:endParaRPr lang="en-US" dirty="0"/>
+            <a:endParaRPr lang="pl-PL" sz="3200" dirty="0" smtClean="0"/>
           </a:p>
           <a:p>
             <a:pPr lvl="0">
@@ -6610,16 +6759,122 @@
               <a:defRPr sz="1800"/>
             </a:pPr>
             <a:r>
-              <a:rPr lang="en-US" sz="3200" dirty="0" smtClean="0"/>
-              <a:t>Demo of final application</a:t>
-            </a:r>
+              <a:rPr lang="pl-PL" sz="3200" dirty="0" err="1" smtClean="0"/>
+              <a:t>Example</a:t>
+            </a:r>
+            <a:r>
+              <a:rPr lang="pl-PL" sz="3200" dirty="0" smtClean="0"/>
+              <a:t> </a:t>
+            </a:r>
+            <a:r>
+              <a:rPr lang="pl-PL" sz="3200" dirty="0" err="1" smtClean="0"/>
+              <a:t>Client</a:t>
+            </a:r>
+            <a:r>
+              <a:rPr lang="pl-PL" sz="3200" dirty="0" smtClean="0"/>
+              <a:t> </a:t>
+            </a:r>
+            <a:r>
+              <a:rPr lang="pl-PL" sz="3200" dirty="0" err="1" smtClean="0"/>
+              <a:t>Script</a:t>
+            </a:r>
+            <a:endParaRPr lang="pl-PL" sz="3200" dirty="0" smtClean="0"/>
+          </a:p>
+          <a:p>
+            <a:pPr lvl="0">
+              <a:buChar char="•"/>
+              <a:defRPr sz="1800"/>
+            </a:pPr>
+            <a:endParaRPr lang="pl-PL" sz="3200" dirty="0" smtClean="0"/>
+          </a:p>
+          <a:p>
+            <a:pPr lvl="0">
+              <a:buChar char="•"/>
+              <a:defRPr sz="1800"/>
+            </a:pPr>
+            <a:r>
+              <a:rPr lang="pl-PL" sz="3200" dirty="0" err="1" smtClean="0"/>
+              <a:t>Example</a:t>
+            </a:r>
+            <a:r>
+              <a:rPr lang="pl-PL" sz="3200" dirty="0" smtClean="0"/>
+              <a:t> </a:t>
+            </a:r>
+            <a:r>
+              <a:rPr lang="pl-PL" sz="3200" dirty="0" err="1" smtClean="0"/>
+              <a:t>Solidworks</a:t>
+            </a:r>
+            <a:r>
+              <a:rPr lang="pl-PL" sz="3200" dirty="0" smtClean="0"/>
+              <a:t> Project</a:t>
+            </a:r>
+            <a:endParaRPr lang="pl-PL" sz="3200" dirty="0" smtClean="0"/>
+          </a:p>
+          <a:p>
+            <a:pPr lvl="0">
+              <a:buChar char="•"/>
+              <a:defRPr sz="1800"/>
+            </a:pPr>
+            <a:r>
+              <a:rPr lang="pl-PL" sz="1600" dirty="0" err="1" smtClean="0"/>
+              <a:t>Short</a:t>
+            </a:r>
+            <a:r>
+              <a:rPr lang="pl-PL" sz="1600" dirty="0" smtClean="0"/>
+              <a:t> </a:t>
+            </a:r>
+            <a:r>
+              <a:rPr lang="pl-PL" sz="1600" dirty="0" err="1" smtClean="0"/>
+              <a:t>movie</a:t>
+            </a:r>
+            <a:r>
+              <a:rPr lang="pl-PL" sz="1600" dirty="0" smtClean="0"/>
+              <a:t> to </a:t>
+            </a:r>
+            <a:r>
+              <a:rPr lang="pl-PL" sz="1600" dirty="0" err="1" smtClean="0"/>
+              <a:t>explain</a:t>
+            </a:r>
+            <a:r>
+              <a:rPr lang="pl-PL" sz="1600" dirty="0" smtClean="0"/>
+              <a:t> one of </a:t>
+            </a:r>
+            <a:r>
+              <a:rPr lang="pl-PL" sz="1600" dirty="0" err="1" smtClean="0"/>
+              <a:t>the</a:t>
+            </a:r>
+            <a:r>
+              <a:rPr lang="pl-PL" sz="1600" dirty="0" smtClean="0"/>
+              <a:t> </a:t>
+            </a:r>
+            <a:r>
+              <a:rPr lang="pl-PL" sz="1600" dirty="0" err="1" smtClean="0"/>
+              <a:t>examples</a:t>
+            </a:r>
+            <a:r>
+              <a:rPr lang="pl-PL" sz="1600" dirty="0" smtClean="0"/>
+              <a:t>: </a:t>
+            </a:r>
+            <a:r>
+              <a:rPr lang="pl-PL" sz="1600" dirty="0" err="1" smtClean="0">
+                <a:hlinkClick r:id="rId2"/>
+              </a:rPr>
+              <a:t>feeding</a:t>
+            </a:r>
+            <a:r>
+              <a:rPr lang="pl-PL" sz="1600" dirty="0" smtClean="0">
+                <a:hlinkClick r:id="rId2"/>
+              </a:rPr>
+              <a:t> system</a:t>
+            </a:r>
+            <a:endParaRPr lang="en-US" sz="3200" dirty="0" smtClean="0"/>
           </a:p>
         </p:txBody>
       </p:sp>
     </p:spTree>
     <p:extLst>
       <p:ext uri="{BB962C8B-B14F-4D97-AF65-F5344CB8AC3E}">
-        <p14:creationId xmlns:p14="http://schemas.microsoft.com/office/powerpoint/2010/main" xmlns="" val="3963483724"/>
+        <p14:creationId xmlns="" xmlns:p14="http://schemas.microsoft.com/office/powerpoint/2010/main" val="3963483724"/>
       </p:ext>
     </p:extLst>
   </p:cSld>
@@ -6667,7 +6922,7 @@
           </a:prstGeom>
           <a:extLst>
             <a:ext uri="{C572A759-6A51-4108-AA02-DFA0A04FC94B}">
-              <ma14:wrappingTextBoxFlag xmlns="" xmlns:ma14="http://schemas.microsoft.com/office/mac/drawingml/2011/main" val="1"/>
+              <ma14:wrappingTextBoxFlag xmlns:ma14="http://schemas.microsoft.com/office/mac/drawingml/2011/main" xmlns="" val="1"/>
             </a:ext>
           </a:extLst>
         </p:spPr>
@@ -6784,7 +7039,7 @@
           </a:prstGeom>
           <a:extLst>
             <a:ext uri="{C572A759-6A51-4108-AA02-DFA0A04FC94B}">
-              <ma14:wrappingTextBoxFlag xmlns="" xmlns:ma14="http://schemas.microsoft.com/office/mac/drawingml/2011/main" val="1"/>
+              <ma14:wrappingTextBoxFlag xmlns:ma14="http://schemas.microsoft.com/office/mac/drawingml/2011/main" xmlns="" val="1"/>
             </a:ext>
           </a:extLst>
         </p:spPr>
@@ -6824,7 +7079,7 @@
           </a:prstGeom>
           <a:extLst>
             <a:ext uri="{C572A759-6A51-4108-AA02-DFA0A04FC94B}">
-              <ma14:wrappingTextBoxFlag xmlns="" xmlns:ma14="http://schemas.microsoft.com/office/mac/drawingml/2011/main" val="1"/>
+              <ma14:wrappingTextBoxFlag xmlns:ma14="http://schemas.microsoft.com/office/mac/drawingml/2011/main" xmlns="" val="1"/>
             </a:ext>
           </a:extLst>
         </p:spPr>
@@ -6947,7 +7202,7 @@
           </a:prstGeom>
           <a:extLst>
             <a:ext uri="{C572A759-6A51-4108-AA02-DFA0A04FC94B}">
-              <ma14:wrappingTextBoxFlag xmlns="" xmlns:ma14="http://schemas.microsoft.com/office/mac/drawingml/2011/main" val="1"/>
+              <ma14:wrappingTextBoxFlag xmlns:ma14="http://schemas.microsoft.com/office/mac/drawingml/2011/main" xmlns="" val="1"/>
             </a:ext>
           </a:extLst>
         </p:spPr>
@@ -6987,7 +7242,7 @@
           </a:prstGeom>
           <a:extLst>
             <a:ext uri="{C572A759-6A51-4108-AA02-DFA0A04FC94B}">
-              <ma14:wrappingTextBoxFlag xmlns="" xmlns:ma14="http://schemas.microsoft.com/office/mac/drawingml/2011/main" val="1"/>
+              <ma14:wrappingTextBoxFlag xmlns:ma14="http://schemas.microsoft.com/office/mac/drawingml/2011/main" xmlns="" val="1"/>
             </a:ext>
           </a:extLst>
         </p:spPr>
@@ -7239,7 +7494,7 @@
           </a:prstGeom>
           <a:extLst>
             <a:ext uri="{C572A759-6A51-4108-AA02-DFA0A04FC94B}">
-              <ma14:wrappingTextBoxFlag xmlns="" xmlns:ma14="http://schemas.microsoft.com/office/mac/drawingml/2011/main" val="1"/>
+              <ma14:wrappingTextBoxFlag xmlns:ma14="http://schemas.microsoft.com/office/mac/drawingml/2011/main" xmlns="" val="1"/>
             </a:ext>
           </a:extLst>
         </p:spPr>
@@ -7284,7 +7539,7 @@
           </a:prstGeom>
           <a:extLst>
             <a:ext uri="{C572A759-6A51-4108-AA02-DFA0A04FC94B}">
-              <ma14:wrappingTextBoxFlag xmlns="" xmlns:ma14="http://schemas.microsoft.com/office/mac/drawingml/2011/main" val="1"/>
+              <ma14:wrappingTextBoxFlag xmlns:ma14="http://schemas.microsoft.com/office/mac/drawingml/2011/main" xmlns="" val="1"/>
             </a:ext>
           </a:extLst>
         </p:spPr>
@@ -7629,7 +7884,7 @@
           </a:prstGeom>
           <a:extLst>
             <a:ext uri="{C572A759-6A51-4108-AA02-DFA0A04FC94B}">
-              <ma14:wrappingTextBoxFlag xmlns="" xmlns:ma14="http://schemas.microsoft.com/office/mac/drawingml/2011/main" val="1"/>
+              <ma14:wrappingTextBoxFlag xmlns:ma14="http://schemas.microsoft.com/office/mac/drawingml/2011/main" xmlns="" val="1"/>
             </a:ext>
           </a:extLst>
         </p:spPr>
@@ -7674,7 +7929,7 @@
           </a:prstGeom>
           <a:extLst>
             <a:ext uri="{C572A759-6A51-4108-AA02-DFA0A04FC94B}">
-              <ma14:wrappingTextBoxFlag xmlns="" xmlns:ma14="http://schemas.microsoft.com/office/mac/drawingml/2011/main" val="1"/>
+              <ma14:wrappingTextBoxFlag xmlns:ma14="http://schemas.microsoft.com/office/mac/drawingml/2011/main" xmlns="" val="1"/>
             </a:ext>
           </a:extLst>
         </p:spPr>
@@ -8226,7 +8481,7 @@
           </a:prstGeom>
           <a:extLst>
             <a:ext uri="{C572A759-6A51-4108-AA02-DFA0A04FC94B}">
-              <ma14:wrappingTextBoxFlag xmlns="" xmlns:ma14="http://schemas.microsoft.com/office/mac/drawingml/2011/main" val="1"/>
+              <ma14:wrappingTextBoxFlag xmlns:ma14="http://schemas.microsoft.com/office/mac/drawingml/2011/main" xmlns="" val="1"/>
             </a:ext>
           </a:extLst>
         </p:spPr>
@@ -8275,7 +8530,7 @@
           </a:prstGeom>
           <a:extLst>
             <a:ext uri="{C572A759-6A51-4108-AA02-DFA0A04FC94B}">
-              <ma14:wrappingTextBoxFlag xmlns="" xmlns:ma14="http://schemas.microsoft.com/office/mac/drawingml/2011/main" val="1"/>
+              <ma14:wrappingTextBoxFlag xmlns:ma14="http://schemas.microsoft.com/office/mac/drawingml/2011/main" xmlns="" val="1"/>
             </a:ext>
           </a:extLst>
         </p:spPr>
@@ -9013,7 +9268,7 @@
           </a:prstGeom>
           <a:extLst>
             <a:ext uri="{C572A759-6A51-4108-AA02-DFA0A04FC94B}">
-              <ma14:wrappingTextBoxFlag xmlns="" xmlns:ma14="http://schemas.microsoft.com/office/mac/drawingml/2011/main" val="1"/>
+              <ma14:wrappingTextBoxFlag xmlns:ma14="http://schemas.microsoft.com/office/mac/drawingml/2011/main" xmlns="" val="1"/>
             </a:ext>
           </a:extLst>
         </p:spPr>
@@ -9054,7 +9309,7 @@
           </a:prstGeom>
           <a:extLst>
             <a:ext uri="{C572A759-6A51-4108-AA02-DFA0A04FC94B}">
-              <ma14:wrappingTextBoxFlag xmlns="" xmlns:ma14="http://schemas.microsoft.com/office/mac/drawingml/2011/main" val="1"/>
+              <ma14:wrappingTextBoxFlag xmlns:ma14="http://schemas.microsoft.com/office/mac/drawingml/2011/main" xmlns="" val="1"/>
             </a:ext>
           </a:extLst>
         </p:spPr>
@@ -9883,7 +10138,7 @@
           </a:prstGeom>
           <a:extLst>
             <a:ext uri="{C572A759-6A51-4108-AA02-DFA0A04FC94B}">
-              <ma14:wrappingTextBoxFlag xmlns="" xmlns:ma14="http://schemas.microsoft.com/office/mac/drawingml/2011/main" val="1"/>
+              <ma14:wrappingTextBoxFlag xmlns:ma14="http://schemas.microsoft.com/office/mac/drawingml/2011/main" xmlns="" val="1"/>
             </a:ext>
           </a:extLst>
         </p:spPr>
@@ -9924,7 +10179,7 @@
           </a:prstGeom>
           <a:extLst>
             <a:ext uri="{C572A759-6A51-4108-AA02-DFA0A04FC94B}">
-              <ma14:wrappingTextBoxFlag xmlns="" xmlns:ma14="http://schemas.microsoft.com/office/mac/drawingml/2011/main" val="1"/>
+              <ma14:wrappingTextBoxFlag xmlns:ma14="http://schemas.microsoft.com/office/mac/drawingml/2011/main" xmlns="" val="1"/>
             </a:ext>
           </a:extLst>
         </p:spPr>
@@ -10004,7 +10259,7 @@
           </a:prstGeom>
           <a:extLst>
             <a:ext uri="{C572A759-6A51-4108-AA02-DFA0A04FC94B}">
-              <ma14:wrappingTextBoxFlag xmlns="" xmlns:ma14="http://schemas.microsoft.com/office/mac/drawingml/2011/main" val="1"/>
+              <ma14:wrappingTextBoxFlag xmlns:ma14="http://schemas.microsoft.com/office/mac/drawingml/2011/main" xmlns="" val="1"/>
             </a:ext>
           </a:extLst>
         </p:spPr>
@@ -10044,7 +10299,7 @@
           </a:prstGeom>
           <a:extLst>
             <a:ext uri="{C572A759-6A51-4108-AA02-DFA0A04FC94B}">
-              <ma14:wrappingTextBoxFlag xmlns="" xmlns:ma14="http://schemas.microsoft.com/office/mac/drawingml/2011/main" val="1"/>
+              <ma14:wrappingTextBoxFlag xmlns:ma14="http://schemas.microsoft.com/office/mac/drawingml/2011/main" xmlns="" val="1"/>
             </a:ext>
           </a:extLst>
         </p:spPr>

</xml_diff>